<commit_message>
minor update 4/3 (fixed covariate plot, cleaned missing values in Value_MWNTD series)
incorporated suggestions from Jenny Hung (Springboard Code Review) and feedback from peers.
</commit_message>
<xml_diff>
--- a/Capstone_Project_1_Deck_v2.pptx
+++ b/Capstone_Project_1_Deck_v2.pptx
@@ -289,7 +289,7 @@
           <a:p>
             <a:fld id="{276D79ED-3FA7-4EF8-964B-EB8BCFAB02F8}" type="datetimeFigureOut">
               <a:rPr lang="en-US" smtClean="0"/>
-              <a:t>3/16/2018</a:t>
+              <a:t>4/3/2018</a:t>
             </a:fld>
             <a:endParaRPr lang="en-US"/>
           </a:p>
@@ -457,7 +457,7 @@
           <a:p>
             <a:fld id="{276D79ED-3FA7-4EF8-964B-EB8BCFAB02F8}" type="datetimeFigureOut">
               <a:rPr lang="en-US" smtClean="0"/>
-              <a:t>3/16/2018</a:t>
+              <a:t>4/3/2018</a:t>
             </a:fld>
             <a:endParaRPr lang="en-US"/>
           </a:p>
@@ -702,7 +702,7 @@
           <a:p>
             <a:fld id="{276D79ED-3FA7-4EF8-964B-EB8BCFAB02F8}" type="datetimeFigureOut">
               <a:rPr lang="en-US" smtClean="0"/>
-              <a:t>3/16/2018</a:t>
+              <a:t>4/3/2018</a:t>
             </a:fld>
             <a:endParaRPr lang="en-US"/>
           </a:p>
@@ -931,7 +931,7 @@
           <a:p>
             <a:fld id="{276D79ED-3FA7-4EF8-964B-EB8BCFAB02F8}" type="datetimeFigureOut">
               <a:rPr lang="en-US" smtClean="0"/>
-              <a:t>3/16/2018</a:t>
+              <a:t>4/3/2018</a:t>
             </a:fld>
             <a:endParaRPr lang="en-US"/>
           </a:p>
@@ -1295,7 +1295,7 @@
           <a:p>
             <a:fld id="{276D79ED-3FA7-4EF8-964B-EB8BCFAB02F8}" type="datetimeFigureOut">
               <a:rPr lang="en-US" smtClean="0"/>
-              <a:t>3/16/2018</a:t>
+              <a:t>4/3/2018</a:t>
             </a:fld>
             <a:endParaRPr lang="en-US"/>
           </a:p>
@@ -1412,7 +1412,7 @@
           <a:p>
             <a:fld id="{276D79ED-3FA7-4EF8-964B-EB8BCFAB02F8}" type="datetimeFigureOut">
               <a:rPr lang="en-US" smtClean="0"/>
-              <a:t>3/16/2018</a:t>
+              <a:t>4/3/2018</a:t>
             </a:fld>
             <a:endParaRPr lang="en-US"/>
           </a:p>
@@ -1507,7 +1507,7 @@
           <a:p>
             <a:fld id="{276D79ED-3FA7-4EF8-964B-EB8BCFAB02F8}" type="datetimeFigureOut">
               <a:rPr lang="en-US" smtClean="0"/>
-              <a:t>3/16/2018</a:t>
+              <a:t>4/3/2018</a:t>
             </a:fld>
             <a:endParaRPr lang="en-US"/>
           </a:p>
@@ -1782,7 +1782,7 @@
           <a:p>
             <a:fld id="{276D79ED-3FA7-4EF8-964B-EB8BCFAB02F8}" type="datetimeFigureOut">
               <a:rPr lang="en-US" smtClean="0"/>
-              <a:t>3/16/2018</a:t>
+              <a:t>4/3/2018</a:t>
             </a:fld>
             <a:endParaRPr lang="en-US"/>
           </a:p>
@@ -2037,7 +2037,7 @@
           <a:p>
             <a:fld id="{276D79ED-3FA7-4EF8-964B-EB8BCFAB02F8}" type="datetimeFigureOut">
               <a:rPr lang="en-US" smtClean="0"/>
-              <a:t>3/16/2018</a:t>
+              <a:t>4/3/2018</a:t>
             </a:fld>
             <a:endParaRPr lang="en-US"/>
           </a:p>
@@ -2307,7 +2307,7 @@
             <a:fld id="{276D79ED-3FA7-4EF8-964B-EB8BCFAB02F8}" type="datetimeFigureOut">
               <a:rPr lang="en-US" smtClean="0"/>
               <a:pPr/>
-              <a:t>3/16/2018</a:t>
+              <a:t>4/3/2018</a:t>
             </a:fld>
             <a:endParaRPr lang="en-US"/>
           </a:p>
@@ -6503,42 +6503,6 @@
           </a:p>
         </p:txBody>
       </p:sp>
-      <p:pic>
-        <p:nvPicPr>
-          <p:cNvPr id="5" name="Picture 4">
-            <a:extLst>
-              <a:ext uri="{FF2B5EF4-FFF2-40B4-BE49-F238E27FC236}">
-                <a16:creationId xmlns:a16="http://schemas.microsoft.com/office/drawing/2014/main" id="{E5CE3A5E-9E08-4AA6-9E9C-84BFED773D4E}"/>
-              </a:ext>
-            </a:extLst>
-          </p:cNvPr>
-          <p:cNvPicPr>
-            <a:picLocks noChangeAspect="1"/>
-          </p:cNvPicPr>
-          <p:nvPr/>
-        </p:nvPicPr>
-        <p:blipFill>
-          <a:blip r:embed="rId2">
-            <a:extLst>
-              <a:ext uri="{28A0092B-C50C-407E-A947-70E740481C1C}">
-                <a14:useLocalDpi xmlns:a14="http://schemas.microsoft.com/office/drawing/2010/main" val="0"/>
-              </a:ext>
-            </a:extLst>
-          </a:blip>
-          <a:stretch>
-            <a:fillRect/>
-          </a:stretch>
-        </p:blipFill>
-        <p:spPr>
-          <a:xfrm>
-            <a:off x="687502" y="2753346"/>
-            <a:ext cx="4754509" cy="3947748"/>
-          </a:xfrm>
-          <a:prstGeom prst="rect">
-            <a:avLst/>
-          </a:prstGeom>
-        </p:spPr>
-      </p:pic>
       <p:sp>
         <p:nvSpPr>
           <p:cNvPr id="6" name="TextBox 5">
@@ -6569,28 +6533,56 @@
           <a:p>
             <a:r>
               <a:rPr lang="en-US" dirty="0"/>
-              <a:t>We see that our substantially </a:t>
-            </a:r>
-            <a:r>
-              <a:rPr lang="en-US" dirty="0" err="1"/>
-              <a:t>overweighted</a:t>
-            </a:r>
+              <a:t>We see that our substantially overweight covariates are Prices of Ether and Iota with Volumes of Bitcoin and Ripple. </a:t>
+            </a:r>
+          </a:p>
+          <a:p>
+            <a:endParaRPr lang="en-US" dirty="0"/>
+          </a:p>
+          <a:p>
             <a:r>
               <a:rPr lang="en-US" dirty="0"/>
-              <a:t> covariates are Prices of Ether and Iota with Volumes of Bitcoin and Ripple. </a:t>
-            </a:r>
-          </a:p>
-          <a:p>
-            <a:endParaRPr lang="en-US" dirty="0"/>
-          </a:p>
-          <a:p>
-            <a:r>
-              <a:rPr lang="en-US" dirty="0"/>
-              <a:t>Conversely, Ripple Prices and Ether volumes are substantially underweighted.</a:t>
-            </a:r>
-          </a:p>
-        </p:txBody>
-      </p:sp>
+              <a:t>Conversely, Ripple Prices and Ether volumes are substantially underweight.</a:t>
+            </a:r>
+          </a:p>
+        </p:txBody>
+      </p:sp>
+      <p:pic>
+        <p:nvPicPr>
+          <p:cNvPr id="7" name="Picture 6">
+            <a:extLst>
+              <a:ext uri="{FF2B5EF4-FFF2-40B4-BE49-F238E27FC236}">
+                <a16:creationId xmlns:a16="http://schemas.microsoft.com/office/drawing/2014/main" id="{D399AFB6-F56B-45D7-BF94-B29F896ED594}"/>
+              </a:ext>
+            </a:extLst>
+          </p:cNvPr>
+          <p:cNvPicPr>
+            <a:picLocks noChangeAspect="1"/>
+          </p:cNvPicPr>
+          <p:nvPr/>
+        </p:nvPicPr>
+        <p:blipFill>
+          <a:blip r:embed="rId2">
+            <a:extLst>
+              <a:ext uri="{28A0092B-C50C-407E-A947-70E740481C1C}">
+                <a14:useLocalDpi xmlns:a14="http://schemas.microsoft.com/office/drawing/2010/main" val="0"/>
+              </a:ext>
+            </a:extLst>
+          </a:blip>
+          <a:stretch>
+            <a:fillRect/>
+          </a:stretch>
+        </p:blipFill>
+        <p:spPr>
+          <a:xfrm>
+            <a:off x="612440" y="2534713"/>
+            <a:ext cx="5093860" cy="4191955"/>
+          </a:xfrm>
+          <a:prstGeom prst="rect">
+            <a:avLst/>
+          </a:prstGeom>
+        </p:spPr>
+      </p:pic>
     </p:spTree>
     <p:extLst>
       <p:ext uri="{BB962C8B-B14F-4D97-AF65-F5344CB8AC3E}">

</xml_diff>

<commit_message>
Fixed Cluster Labels and Slight Formatting improvements
Fixed Cluster Labels and Slight Formatting improvements, and hyperlink displays on references page
</commit_message>
<xml_diff>
--- a/Capstone_Project_1_Deck_v2.pptx
+++ b/Capstone_Project_1_Deck_v2.pptx
@@ -289,7 +289,7 @@
           <a:p>
             <a:fld id="{276D79ED-3FA7-4EF8-964B-EB8BCFAB02F8}" type="datetimeFigureOut">
               <a:rPr lang="en-US" smtClean="0"/>
-              <a:t>4/3/2018</a:t>
+              <a:t>5/16/2018</a:t>
             </a:fld>
             <a:endParaRPr lang="en-US"/>
           </a:p>
@@ -457,7 +457,7 @@
           <a:p>
             <a:fld id="{276D79ED-3FA7-4EF8-964B-EB8BCFAB02F8}" type="datetimeFigureOut">
               <a:rPr lang="en-US" smtClean="0"/>
-              <a:t>4/3/2018</a:t>
+              <a:t>5/16/2018</a:t>
             </a:fld>
             <a:endParaRPr lang="en-US"/>
           </a:p>
@@ -702,7 +702,7 @@
           <a:p>
             <a:fld id="{276D79ED-3FA7-4EF8-964B-EB8BCFAB02F8}" type="datetimeFigureOut">
               <a:rPr lang="en-US" smtClean="0"/>
-              <a:t>4/3/2018</a:t>
+              <a:t>5/16/2018</a:t>
             </a:fld>
             <a:endParaRPr lang="en-US"/>
           </a:p>
@@ -931,7 +931,7 @@
           <a:p>
             <a:fld id="{276D79ED-3FA7-4EF8-964B-EB8BCFAB02F8}" type="datetimeFigureOut">
               <a:rPr lang="en-US" smtClean="0"/>
-              <a:t>4/3/2018</a:t>
+              <a:t>5/16/2018</a:t>
             </a:fld>
             <a:endParaRPr lang="en-US"/>
           </a:p>
@@ -1295,7 +1295,7 @@
           <a:p>
             <a:fld id="{276D79ED-3FA7-4EF8-964B-EB8BCFAB02F8}" type="datetimeFigureOut">
               <a:rPr lang="en-US" smtClean="0"/>
-              <a:t>4/3/2018</a:t>
+              <a:t>5/16/2018</a:t>
             </a:fld>
             <a:endParaRPr lang="en-US"/>
           </a:p>
@@ -1412,7 +1412,7 @@
           <a:p>
             <a:fld id="{276D79ED-3FA7-4EF8-964B-EB8BCFAB02F8}" type="datetimeFigureOut">
               <a:rPr lang="en-US" smtClean="0"/>
-              <a:t>4/3/2018</a:t>
+              <a:t>5/16/2018</a:t>
             </a:fld>
             <a:endParaRPr lang="en-US"/>
           </a:p>
@@ -1507,7 +1507,7 @@
           <a:p>
             <a:fld id="{276D79ED-3FA7-4EF8-964B-EB8BCFAB02F8}" type="datetimeFigureOut">
               <a:rPr lang="en-US" smtClean="0"/>
-              <a:t>4/3/2018</a:t>
+              <a:t>5/16/2018</a:t>
             </a:fld>
             <a:endParaRPr lang="en-US"/>
           </a:p>
@@ -1782,7 +1782,7 @@
           <a:p>
             <a:fld id="{276D79ED-3FA7-4EF8-964B-EB8BCFAB02F8}" type="datetimeFigureOut">
               <a:rPr lang="en-US" smtClean="0"/>
-              <a:t>4/3/2018</a:t>
+              <a:t>5/16/2018</a:t>
             </a:fld>
             <a:endParaRPr lang="en-US"/>
           </a:p>
@@ -2037,7 +2037,7 @@
           <a:p>
             <a:fld id="{276D79ED-3FA7-4EF8-964B-EB8BCFAB02F8}" type="datetimeFigureOut">
               <a:rPr lang="en-US" smtClean="0"/>
-              <a:t>4/3/2018</a:t>
+              <a:t>5/16/2018</a:t>
             </a:fld>
             <a:endParaRPr lang="en-US"/>
           </a:p>
@@ -2307,7 +2307,7 @@
             <a:fld id="{276D79ED-3FA7-4EF8-964B-EB8BCFAB02F8}" type="datetimeFigureOut">
               <a:rPr lang="en-US" smtClean="0"/>
               <a:pPr/>
-              <a:t>4/3/2018</a:t>
+              <a:t>5/16/2018</a:t>
             </a:fld>
             <a:endParaRPr lang="en-US"/>
           </a:p>
@@ -4741,7 +4741,7 @@
               <a:rPr lang="en-US" sz="2200" dirty="0">
                 <a:latin typeface="+mn-lt"/>
               </a:rPr>
-              <a:t>To accomplish, used Principal Component Analysis testing on all possible number of components.  Choose using “elbow-method” and where majority of variance can be explained (see below figure). </a:t>
+              <a:t>To accomplish, used Principal Component Analysis and tested on all possible number of components.  Choose using “elbow-method” and where majority of variance can be explained (see below figure). </a:t>
             </a:r>
           </a:p>
         </p:txBody>
@@ -5449,7 +5449,7 @@
           <a:p>
             <a:r>
               <a:rPr lang="en-US" sz="1400" dirty="0"/>
-              <a:t>4: Incubation-stage Bitcoin: Illiquid market and nascent market dynamics</a:t>
+              <a:t>0: Incubation-stage Bitcoin: Illiquid market and nascent market dynamics</a:t>
             </a:r>
           </a:p>
         </p:txBody>
@@ -5498,7 +5498,7 @@
           <a:p>
             <a:r>
               <a:rPr lang="en-US" sz="1400" dirty="0"/>
-              <a:t>0: Early Adoption: Some e-</a:t>
+              <a:t>1: Early Adoption: Some e-</a:t>
             </a:r>
             <a:r>
               <a:rPr lang="en-US" sz="1400" dirty="0" err="1"/>
@@ -5612,7 +5612,7 @@
           <a:p>
             <a:r>
               <a:rPr lang="en-US" sz="1400" dirty="0"/>
-              <a:t>1: Bitcoin gains more legitimacy among lawmakers and financial institutions. Bitcoin Cash hard-fork (Aug 2017)</a:t>
+              <a:t>3: Bitcoin gains more legitimacy among lawmakers and financial institutions. Bitcoin Cash hard-fork (Aug 2017)</a:t>
             </a:r>
           </a:p>
         </p:txBody>
@@ -5702,7 +5702,7 @@
           <a:p>
             <a:r>
               <a:rPr lang="en-US" sz="1400" dirty="0"/>
-              <a:t>3: Bitcoin price action exhibits irrational exuberance</a:t>
+              <a:t>4: Bitcoin price action exhibits irrational exuberance</a:t>
             </a:r>
           </a:p>
         </p:txBody>
@@ -6052,7 +6052,7 @@
               <a:rPr lang="en-US" dirty="0">
                 <a:latin typeface="+mn-lt"/>
               </a:rPr>
-              <a:t>The objective of the model is to group the data into distinct clusters differentiated by any number of characteristics.   That is, data points within a given cluster are more alike to other data in the same cluster than data in another cluster.</a:t>
+              <a:t>The objective of the model is to group the data into distinct clusters differentiated by any number of characteristics.   That is, data points within a given cluster are more alike to other data points in the same cluster than data points in another cluster.</a:t>
             </a:r>
           </a:p>
           <a:p>
@@ -6068,7 +6068,7 @@
               <a:rPr lang="en-US" dirty="0">
                 <a:latin typeface="+mn-lt"/>
               </a:rPr>
-              <a:t>As a result, our model primarily used Price and Volume as criteria for clustering.  With some overlap, the model is also grouping the data in distinctive “eras” as I assumed at the onset.  </a:t>
+              <a:t>As a result, our model primarily used Price and Volume as criteria for clustering.  With some overlap, the model is also grouping the data in distinctive “eras” as initially thought.  </a:t>
             </a:r>
           </a:p>
           <a:p>
@@ -6629,7 +6629,12 @@
             <p:ph type="title"/>
           </p:nvPr>
         </p:nvSpPr>
-        <p:spPr/>
+        <p:spPr>
+          <a:xfrm>
+            <a:off x="838200" y="242033"/>
+            <a:ext cx="10515600" cy="1325563"/>
+          </a:xfrm>
+        </p:spPr>
         <p:txBody>
           <a:bodyPr/>
           <a:lstStyle/>
@@ -6659,7 +6664,7 @@
         </p:nvSpPr>
         <p:spPr>
           <a:xfrm>
-            <a:off x="838200" y="1789611"/>
+            <a:off x="838200" y="1571579"/>
             <a:ext cx="10515600" cy="935834"/>
           </a:xfrm>
         </p:spPr>
@@ -6704,7 +6709,7 @@
         </p:nvSpPr>
         <p:spPr>
           <a:xfrm>
-            <a:off x="905523" y="2824368"/>
+            <a:off x="905523" y="2507413"/>
             <a:ext cx="4678532" cy="4247317"/>
           </a:xfrm>
           <a:prstGeom prst="rect">
@@ -6855,7 +6860,12 @@
             <p:ph type="title"/>
           </p:nvPr>
         </p:nvSpPr>
-        <p:spPr/>
+        <p:spPr>
+          <a:xfrm>
+            <a:off x="838200" y="208158"/>
+            <a:ext cx="10515600" cy="1325563"/>
+          </a:xfrm>
+        </p:spPr>
         <p:txBody>
           <a:bodyPr/>
           <a:lstStyle/>
@@ -6885,7 +6895,7 @@
         </p:nvSpPr>
         <p:spPr>
           <a:xfrm>
-            <a:off x="838200" y="1789611"/>
+            <a:off x="838200" y="1270865"/>
             <a:ext cx="10515600" cy="1325563"/>
           </a:xfrm>
         </p:spPr>
@@ -6914,7 +6924,7 @@
         </p:nvSpPr>
         <p:spPr>
           <a:xfrm>
-            <a:off x="7994397" y="3076114"/>
+            <a:off x="8011981" y="2794101"/>
             <a:ext cx="2689934" cy="3139321"/>
           </a:xfrm>
           <a:prstGeom prst="rect">
@@ -6972,7 +6982,7 @@
         </p:blipFill>
         <p:spPr>
           <a:xfrm>
-            <a:off x="838200" y="3115174"/>
+            <a:off x="838200" y="2596428"/>
             <a:ext cx="6760561" cy="3534668"/>
           </a:xfrm>
           <a:prstGeom prst="rect">
@@ -7470,23 +7480,18 @@
               </a:rPr>
               <a:t>Code and Python Notebooks: </a:t>
             </a:r>
-          </a:p>
-          <a:p>
-            <a:pPr marL="0" indent="0">
-              <a:buNone/>
-            </a:pPr>
             <a:r>
               <a:rPr lang="en-US" sz="2400" dirty="0">
                 <a:latin typeface="+mn-lt"/>
                 <a:hlinkClick r:id="rId3"/>
               </a:rPr>
-              <a:t>https://github.com/thegarrickchu/Springboard/tree/Capstone-Project-1</a:t>
+              <a:t>Link</a:t>
             </a:r>
             <a:r>
               <a:rPr lang="en-US" sz="2400" dirty="0">
                 <a:latin typeface="+mn-lt"/>
               </a:rPr>
-              <a:t> </a:t>
+              <a:t>.</a:t>
             </a:r>
           </a:p>
           <a:p>
@@ -7506,11 +7511,14 @@
                 <a:latin typeface="+mn-lt"/>
                 <a:hlinkClick r:id="rId4"/>
               </a:rPr>
-              <a:t>https://github.com/thegarrickchu/Springboard-Bitcoin_Digital_Gold_Rush-Capstone-1-Project-/blob/master/Springboard%20Capstone%20Project%201%20-%20Final%20Report%20(Garrick%20Chu).pdf</a:t>
-            </a:r>
-            <a:endParaRPr lang="en-US" sz="2400" dirty="0">
-              <a:latin typeface="+mn-lt"/>
-            </a:endParaRPr>
+              <a:t>Link</a:t>
+            </a:r>
+            <a:r>
+              <a:rPr lang="en-US" sz="2400" dirty="0">
+                <a:latin typeface="+mn-lt"/>
+              </a:rPr>
+              <a:t>. </a:t>
+            </a:r>
           </a:p>
         </p:txBody>
       </p:sp>
@@ -8722,7 +8730,7 @@
         <p:spPr/>
         <p:txBody>
           <a:bodyPr>
-            <a:normAutofit lnSpcReduction="10000"/>
+            <a:normAutofit fontScale="92500"/>
           </a:bodyPr>
           <a:lstStyle/>
           <a:p>
@@ -8754,7 +8762,7 @@
               <a:rPr lang="en-US" dirty="0">
                 <a:latin typeface="+mn-lt"/>
               </a:rPr>
-              <a:t>If the ratio of trade transactions to total decreases over time, this implies that either trade transactions are decreasing relative to all transactions or that peer-to-peer payments are increasing relatively. </a:t>
+              <a:t>If the ratio of trade transactions to total transactions decreases over time, this implies that either trade transactions are decreasing relative to all transactions or that peer-to-peer payments are increasing. </a:t>
             </a:r>
           </a:p>
           <a:p>

</xml_diff>